<commit_message>
Melhorias na revisao de literatura e correcao nas referencias das imagens
</commit_message>
<xml_diff>
--- a/Apresentação.pptx
+++ b/Apresentação.pptx
@@ -10,8 +10,8 @@
   <p:sldIdLst>
     <p:sldId id="256" r:id="rId2"/>
     <p:sldId id="272" r:id="rId3"/>
-    <p:sldId id="273" r:id="rId4"/>
-    <p:sldId id="277" r:id="rId5"/>
+    <p:sldId id="277" r:id="rId4"/>
+    <p:sldId id="273" r:id="rId5"/>
     <p:sldId id="274" r:id="rId6"/>
     <p:sldId id="275" r:id="rId7"/>
     <p:sldId id="276" r:id="rId8"/>
@@ -126,8 +126,8 @@
           <p14:sldIdLst>
             <p14:sldId id="256"/>
             <p14:sldId id="272"/>
+            <p14:sldId id="277"/>
             <p14:sldId id="273"/>
-            <p14:sldId id="277"/>
             <p14:sldId id="274"/>
             <p14:sldId id="275"/>
             <p14:sldId id="276"/>
@@ -241,7 +241,7 @@
           <a:p>
             <a:fld id="{ED6C2EB7-4FE1-0145-BAAF-4D7DE7DF88C9}" type="datetimeFigureOut">
               <a:rPr lang="pt-BR" smtClean="0"/>
-              <a:t>31/05/2016</a:t>
+              <a:t>01/06/16</a:t>
             </a:fld>
             <a:endParaRPr lang="pt-BR"/>
           </a:p>
@@ -400,7 +400,7 @@
           <a:p>
             <a:fld id="{50F572C4-1653-A746-8182-35101AF0EA0D}" type="slidenum">
               <a:rPr lang="pt-BR" smtClean="0"/>
-              <a:t>‹nº›</a:t>
+              <a:t>‹n.º›</a:t>
             </a:fld>
             <a:endParaRPr lang="pt-BR"/>
           </a:p>
@@ -700,7 +700,7 @@
           <a:p>
             <a:fld id="{7CF910A2-AEE9-494C-8ECE-D83CCFC17B69}" type="datetime1">
               <a:rPr lang="pt-BR" smtClean="0"/>
-              <a:t>31/05/2016</a:t>
+              <a:t>01/06/16</a:t>
             </a:fld>
             <a:endParaRPr lang="en-US" dirty="0"/>
           </a:p>
@@ -743,7 +743,7 @@
             <a:fld id="{D57F1E4F-1CFF-5643-939E-217C01CDF565}" type="slidenum">
               <a:rPr lang="en-US" smtClean="0"/>
               <a:pPr/>
-              <a:t>‹nº›</a:t>
+              <a:t>‹n.º›</a:t>
             </a:fld>
             <a:endParaRPr lang="en-US" dirty="0" smtClean="0"/>
           </a:p>
@@ -1142,7 +1142,7 @@
           <a:p>
             <a:fld id="{DB63BD9E-5B88-0C4B-9505-8FCED04AF271}" type="datetime1">
               <a:rPr lang="pt-BR" smtClean="0"/>
-              <a:t>31/05/2016</a:t>
+              <a:t>01/06/16</a:t>
             </a:fld>
             <a:endParaRPr lang="en-US" dirty="0"/>
           </a:p>
@@ -1185,12 +1185,12 @@
             <a:fld id="{4ABF6952-4E48-774C-830F-434D8CB1F8AA}" type="slidenum">
               <a:rPr lang="en-US" smtClean="0"/>
               <a:pPr/>
-              <a:t>‹nº›</a:t>
+              <a:t>‹n.º›</a:t>
             </a:fld>
             <a:fld id="{D57F1E4F-1CFF-5643-939E-217C01CDF565}" type="slidenum">
               <a:rPr lang="en-US" smtClean="0"/>
               <a:pPr/>
-              <a:t>‹nº›</a:t>
+              <a:t>‹n.º›</a:t>
             </a:fld>
             <a:endParaRPr lang="en-US" dirty="0"/>
           </a:p>
@@ -1398,7 +1398,7 @@
           <a:p>
             <a:fld id="{2D31E35D-B975-3F4F-BFBA-FC0F271430BE}" type="datetime1">
               <a:rPr lang="pt-BR" smtClean="0"/>
-              <a:t>31/05/2016</a:t>
+              <a:t>01/06/16</a:t>
             </a:fld>
             <a:endParaRPr lang="en-US" dirty="0"/>
           </a:p>
@@ -1441,12 +1441,12 @@
             <a:fld id="{4ABF6952-4E48-774C-830F-434D8CB1F8AA}" type="slidenum">
               <a:rPr lang="en-US" smtClean="0"/>
               <a:pPr/>
-              <a:t>‹nº›</a:t>
+              <a:t>‹n.º›</a:t>
             </a:fld>
             <a:fld id="{D57F1E4F-1CFF-5643-939E-217C01CDF565}" type="slidenum">
               <a:rPr lang="en-US" smtClean="0"/>
               <a:pPr/>
-              <a:t>‹nº›</a:t>
+              <a:t>‹n.º›</a:t>
             </a:fld>
             <a:endParaRPr lang="en-US" dirty="0"/>
           </a:p>
@@ -1712,7 +1712,7 @@
           <a:p>
             <a:fld id="{C11DC2A2-1E04-6147-8E09-7B480616B389}" type="datetime1">
               <a:rPr lang="pt-BR" smtClean="0"/>
-              <a:t>31/05/2016</a:t>
+              <a:t>01/06/16</a:t>
             </a:fld>
             <a:endParaRPr lang="en-US" dirty="0"/>
           </a:p>
@@ -1755,12 +1755,12 @@
             <a:fld id="{4ABF6952-4E48-774C-830F-434D8CB1F8AA}" type="slidenum">
               <a:rPr lang="en-US" smtClean="0"/>
               <a:pPr/>
-              <a:t>‹nº›</a:t>
+              <a:t>‹n.º›</a:t>
             </a:fld>
             <a:fld id="{D57F1E4F-1CFF-5643-939E-217C01CDF565}" type="slidenum">
               <a:rPr lang="en-US" smtClean="0"/>
               <a:pPr/>
-              <a:t>‹nº›</a:t>
+              <a:t>‹n.º›</a:t>
             </a:fld>
             <a:endParaRPr lang="en-US" dirty="0"/>
           </a:p>
@@ -2036,7 +2036,7 @@
           <a:p>
             <a:fld id="{49E6E62F-DF90-7C45-B32E-F018412E7A1A}" type="datetime1">
               <a:rPr lang="pt-BR" smtClean="0"/>
-              <a:t>31/05/2016</a:t>
+              <a:t>01/06/16</a:t>
             </a:fld>
             <a:endParaRPr lang="en-US" dirty="0"/>
           </a:p>
@@ -2079,12 +2079,12 @@
             <a:fld id="{4ABF6952-4E48-774C-830F-434D8CB1F8AA}" type="slidenum">
               <a:rPr lang="en-US" smtClean="0"/>
               <a:pPr/>
-              <a:t>‹nº›</a:t>
+              <a:t>‹n.º›</a:t>
             </a:fld>
             <a:fld id="{D57F1E4F-1CFF-5643-939E-217C01CDF565}" type="slidenum">
               <a:rPr lang="en-US" smtClean="0"/>
               <a:pPr/>
-              <a:t>‹nº›</a:t>
+              <a:t>‹n.º›</a:t>
             </a:fld>
             <a:endParaRPr lang="en-US" dirty="0"/>
           </a:p>
@@ -2344,7 +2344,7 @@
           <a:p>
             <a:fld id="{010D4701-6CC1-3046-9984-CD40D45677DA}" type="datetime1">
               <a:rPr lang="pt-BR" smtClean="0"/>
-              <a:t>31/05/2016</a:t>
+              <a:t>01/06/16</a:t>
             </a:fld>
             <a:endParaRPr lang="en-US" dirty="0"/>
           </a:p>
@@ -2387,12 +2387,12 @@
             <a:fld id="{4ABF6952-4E48-774C-830F-434D8CB1F8AA}" type="slidenum">
               <a:rPr lang="en-US" smtClean="0"/>
               <a:pPr/>
-              <a:t>‹nº›</a:t>
+              <a:t>‹n.º›</a:t>
             </a:fld>
             <a:fld id="{D57F1E4F-1CFF-5643-939E-217C01CDF565}" type="slidenum">
               <a:rPr lang="en-US" smtClean="0"/>
               <a:pPr/>
-              <a:t>‹nº›</a:t>
+              <a:t>‹n.º›</a:t>
             </a:fld>
             <a:endParaRPr lang="en-US" dirty="0"/>
           </a:p>
@@ -2717,7 +2717,7 @@
           <a:p>
             <a:fld id="{F51D1A75-3DD2-BF4B-A756-F4C41EA5D713}" type="datetime1">
               <a:rPr lang="pt-BR" smtClean="0"/>
-              <a:t>31/05/2016</a:t>
+              <a:t>01/06/16</a:t>
             </a:fld>
             <a:endParaRPr lang="en-US" dirty="0"/>
           </a:p>
@@ -2760,12 +2760,12 @@
             <a:fld id="{4ABF6952-4E48-774C-830F-434D8CB1F8AA}" type="slidenum">
               <a:rPr lang="en-US" smtClean="0"/>
               <a:pPr/>
-              <a:t>‹nº›</a:t>
+              <a:t>‹n.º›</a:t>
             </a:fld>
             <a:fld id="{D57F1E4F-1CFF-5643-939E-217C01CDF565}" type="slidenum">
               <a:rPr lang="en-US" smtClean="0"/>
               <a:pPr/>
-              <a:t>‹nº›</a:t>
+              <a:t>‹n.º›</a:t>
             </a:fld>
             <a:endParaRPr lang="en-US" dirty="0"/>
           </a:p>
@@ -2897,7 +2897,7 @@
           <a:p>
             <a:fld id="{D0B0705F-BFA7-2146-82E4-F98876D59FC6}" type="datetime1">
               <a:rPr lang="pt-BR" smtClean="0"/>
-              <a:t>31/05/2016</a:t>
+              <a:t>01/06/16</a:t>
             </a:fld>
             <a:endParaRPr lang="en-US" dirty="0"/>
           </a:p>
@@ -2940,7 +2940,7 @@
             <a:fld id="{D57F1E4F-1CFF-5643-939E-217C01CDF565}" type="slidenum">
               <a:rPr lang="en-US" smtClean="0"/>
               <a:pPr/>
-              <a:t>‹nº›</a:t>
+              <a:t>‹n.º›</a:t>
             </a:fld>
             <a:endParaRPr lang="en-US" dirty="0"/>
           </a:p>
@@ -3078,7 +3078,7 @@
           <a:p>
             <a:fld id="{AA053136-878A-1E42-8EBC-EE9076C842CC}" type="datetime1">
               <a:rPr lang="pt-BR" smtClean="0"/>
-              <a:t>31/05/2016</a:t>
+              <a:t>01/06/16</a:t>
             </a:fld>
             <a:endParaRPr lang="en-US" dirty="0"/>
           </a:p>
@@ -3121,7 +3121,7 @@
             <a:fld id="{D57F1E4F-1CFF-5643-939E-217C01CDF565}" type="slidenum">
               <a:rPr lang="en-US" smtClean="0"/>
               <a:pPr/>
-              <a:t>‹nº›</a:t>
+              <a:t>‹n.º›</a:t>
             </a:fld>
             <a:endParaRPr lang="en-US" dirty="0"/>
           </a:p>
@@ -3249,7 +3249,7 @@
           <a:p>
             <a:fld id="{18A0768A-70D4-5341-89FE-2C77E4E108E6}" type="datetime1">
               <a:rPr lang="pt-BR" smtClean="0"/>
-              <a:t>31/05/2016</a:t>
+              <a:t>01/06/16</a:t>
             </a:fld>
             <a:endParaRPr lang="en-US" dirty="0"/>
           </a:p>
@@ -3292,7 +3292,7 @@
             <a:fld id="{D57F1E4F-1CFF-5643-939E-217C01CDF565}" type="slidenum">
               <a:rPr lang="en-US" smtClean="0"/>
               <a:pPr/>
-              <a:t>‹nº›</a:t>
+              <a:t>‹n.º›</a:t>
             </a:fld>
             <a:endParaRPr lang="en-US" dirty="0"/>
           </a:p>
@@ -3573,7 +3573,7 @@
             <a:fld id="{D57F1E4F-1CFF-5643-939E-217C01CDF565}" type="slidenum">
               <a:rPr lang="en-US" smtClean="0"/>
               <a:pPr/>
-              <a:t>‹nº›</a:t>
+              <a:t>‹n.º›</a:t>
             </a:fld>
             <a:endParaRPr lang="en-US" dirty="0"/>
           </a:p>
@@ -3774,7 +3774,7 @@
           <a:p>
             <a:fld id="{B56619BA-50EB-BE4E-B3B6-B042CA3512F6}" type="datetime1">
               <a:rPr lang="pt-BR" smtClean="0"/>
-              <a:t>31/05/2016</a:t>
+              <a:t>01/06/16</a:t>
             </a:fld>
             <a:endParaRPr lang="en-US" dirty="0"/>
           </a:p>
@@ -3817,7 +3817,7 @@
             <a:fld id="{D57F1E4F-1CFF-5643-939E-217C01CDF565}" type="slidenum">
               <a:rPr lang="en-US" smtClean="0"/>
               <a:pPr/>
-              <a:t>‹nº›</a:t>
+              <a:t>‹n.º›</a:t>
             </a:fld>
             <a:endParaRPr lang="en-US" dirty="0"/>
           </a:p>
@@ -4157,7 +4157,7 @@
           <a:p>
             <a:fld id="{E7A703A8-BCAB-3341-BE6C-F6E5BAA2F38C}" type="datetime1">
               <a:rPr lang="pt-BR" smtClean="0"/>
-              <a:t>31/05/2016</a:t>
+              <a:t>01/06/16</a:t>
             </a:fld>
             <a:endParaRPr lang="en-US" dirty="0"/>
           </a:p>
@@ -4200,7 +4200,7 @@
             <a:fld id="{D57F1E4F-1CFF-5643-939E-217C01CDF565}" type="slidenum">
               <a:rPr lang="en-US" smtClean="0"/>
               <a:pPr/>
-              <a:t>‹nº›</a:t>
+              <a:t>‹n.º›</a:t>
             </a:fld>
             <a:endParaRPr lang="en-US" dirty="0"/>
           </a:p>
@@ -4276,7 +4276,7 @@
           <a:p>
             <a:fld id="{354A6A2B-BB1B-ED42-B3E6-8A2921BA1BFD}" type="datetime1">
               <a:rPr lang="pt-BR" smtClean="0"/>
-              <a:t>31/05/2016</a:t>
+              <a:t>01/06/16</a:t>
             </a:fld>
             <a:endParaRPr lang="en-US" dirty="0"/>
           </a:p>
@@ -4319,7 +4319,7 @@
             <a:fld id="{D57F1E4F-1CFF-5643-939E-217C01CDF565}" type="slidenum">
               <a:rPr lang="en-US" smtClean="0"/>
               <a:pPr/>
-              <a:t>‹nº›</a:t>
+              <a:t>‹n.º›</a:t>
             </a:fld>
             <a:endParaRPr lang="en-US" dirty="0"/>
           </a:p>
@@ -4372,7 +4372,7 @@
           <a:p>
             <a:fld id="{64B63E80-2319-074E-85E8-2C01938C4310}" type="datetime1">
               <a:rPr lang="pt-BR" smtClean="0"/>
-              <a:t>31/05/2016</a:t>
+              <a:t>01/06/16</a:t>
             </a:fld>
             <a:endParaRPr lang="en-US" dirty="0"/>
           </a:p>
@@ -4415,7 +4415,7 @@
             <a:fld id="{D57F1E4F-1CFF-5643-939E-217C01CDF565}" type="slidenum">
               <a:rPr lang="en-US" smtClean="0"/>
               <a:pPr/>
-              <a:t>‹nº›</a:t>
+              <a:t>‹n.º›</a:t>
             </a:fld>
             <a:endParaRPr lang="en-US" dirty="0"/>
           </a:p>
@@ -4633,7 +4633,7 @@
           <a:p>
             <a:fld id="{83DCC015-2D07-C548-8FB4-2780CACB760D}" type="datetime1">
               <a:rPr lang="pt-BR" smtClean="0"/>
-              <a:t>31/05/2016</a:t>
+              <a:t>01/06/16</a:t>
             </a:fld>
             <a:endParaRPr lang="en-US" dirty="0"/>
           </a:p>
@@ -4676,7 +4676,7 @@
             <a:fld id="{D57F1E4F-1CFF-5643-939E-217C01CDF565}" type="slidenum">
               <a:rPr lang="en-US" smtClean="0"/>
               <a:pPr/>
-              <a:t>‹nº›</a:t>
+              <a:t>‹n.º›</a:t>
             </a:fld>
             <a:endParaRPr lang="en-US" dirty="0"/>
           </a:p>
@@ -4922,7 +4922,7 @@
           <a:p>
             <a:fld id="{E528F2E4-DE8D-D64D-8368-708812B696C4}" type="datetime1">
               <a:rPr lang="pt-BR" smtClean="0"/>
-              <a:t>31/05/2016</a:t>
+              <a:t>01/06/16</a:t>
             </a:fld>
             <a:endParaRPr lang="en-US" dirty="0"/>
           </a:p>
@@ -4965,7 +4965,7 @@
             <a:fld id="{D57F1E4F-1CFF-5643-939E-217C01CDF565}" type="slidenum">
               <a:rPr lang="en-US" smtClean="0"/>
               <a:pPr/>
-              <a:t>‹nº›</a:t>
+              <a:t>‹n.º›</a:t>
             </a:fld>
             <a:endParaRPr lang="en-US" dirty="0"/>
           </a:p>
@@ -5329,7 +5329,7 @@
           <a:p>
             <a:fld id="{95913753-D19B-8941-866F-AE50A85BE452}" type="datetime1">
               <a:rPr lang="pt-BR" smtClean="0"/>
-              <a:t>31/05/2016</a:t>
+              <a:t>01/06/16</a:t>
             </a:fld>
             <a:endParaRPr lang="en-US" dirty="0"/>
           </a:p>
@@ -5412,12 +5412,12 @@
             <a:fld id="{4ABF6952-4E48-774C-830F-434D8CB1F8AA}" type="slidenum">
               <a:rPr lang="en-US" smtClean="0"/>
               <a:pPr/>
-              <a:t>‹nº›</a:t>
+              <a:t>‹n.º›</a:t>
             </a:fld>
             <a:fld id="{D57F1E4F-1CFF-5643-939E-217C01CDF565}" type="slidenum">
               <a:rPr lang="en-US" smtClean="0"/>
               <a:pPr/>
-              <a:t>‹nº›</a:t>
+              <a:t>‹n.º›</a:t>
             </a:fld>
             <a:endParaRPr lang="en-US" dirty="0"/>
           </a:p>
@@ -5901,9 +5901,20 @@
             <a:pPr algn="ctr"/>
             <a:r>
               <a:rPr lang="pt-BR" sz="3200" dirty="0" smtClean="0"/>
-              <a:t>Titulo a definir</a:t>
-            </a:r>
-            <a:endParaRPr lang="pt-BR" sz="3200" dirty="0"/>
+              <a:t>Titulo a </a:t>
+            </a:r>
+            <a:r>
+              <a:rPr lang="pt-BR" sz="3200" dirty="0" smtClean="0"/>
+              <a:t>definir</a:t>
+            </a:r>
+            <a:br>
+              <a:rPr lang="pt-BR" sz="3200" dirty="0" smtClean="0"/>
+            </a:br>
+            <a:r>
+              <a:rPr lang="pt-BR" sz="1600" dirty="0" smtClean="0"/>
+              <a:t>junho/2014</a:t>
+            </a:r>
+            <a:endParaRPr lang="pt-BR" sz="1600" dirty="0"/>
           </a:p>
         </p:txBody>
       </p:sp>
@@ -6004,7 +6015,7 @@
               </a:rPr>
               <a:t>Heredia</a:t>
             </a:r>
-            <a:endParaRPr lang="pt-BR" dirty="0">
+            <a:endParaRPr lang="pt-BR" dirty="0" smtClean="0">
               <a:solidFill>
                 <a:schemeClr val="tx1"/>
               </a:solidFill>
@@ -6730,7 +6741,7 @@
         </p:nvSpPr>
         <p:spPr>
           <a:xfrm>
-            <a:off x="684213" y="881323"/>
+            <a:off x="684212" y="1528917"/>
             <a:ext cx="8415542" cy="4855800"/>
           </a:xfrm>
         </p:spPr>
@@ -6740,7 +6751,345 @@
           </a:bodyPr>
           <a:lstStyle/>
           <a:p>
-            <a:pPr marL="285750" indent="-285750">
+            <a:pPr marL="342900" indent="-342900">
+              <a:buFont typeface="Arial" charset="0"/>
+              <a:buChar char="•"/>
+            </a:pPr>
+            <a:r>
+              <a:rPr lang="pt-BR" sz="2000" dirty="0">
+                <a:solidFill>
+                  <a:schemeClr val="tx1"/>
+                </a:solidFill>
+              </a:rPr>
+              <a:t>ALAOUI, O. F. S. M.; EL-GHAZAWI, T. A </a:t>
+            </a:r>
+            <a:r>
+              <a:rPr lang="pt-BR" sz="2000" dirty="0" err="1">
+                <a:solidFill>
+                  <a:schemeClr val="tx1"/>
+                </a:solidFill>
+              </a:rPr>
+              <a:t>parallel</a:t>
+            </a:r>
+            <a:r>
+              <a:rPr lang="pt-BR" sz="2000" dirty="0">
+                <a:solidFill>
+                  <a:schemeClr val="tx1"/>
+                </a:solidFill>
+              </a:rPr>
+              <a:t> </a:t>
+            </a:r>
+            <a:r>
+              <a:rPr lang="pt-BR" sz="2000" dirty="0" err="1">
+                <a:solidFill>
+                  <a:schemeClr val="tx1"/>
+                </a:solidFill>
+              </a:rPr>
+              <a:t>genetic</a:t>
+            </a:r>
+            <a:r>
+              <a:rPr lang="pt-BR" sz="2000" dirty="0">
+                <a:solidFill>
+                  <a:schemeClr val="tx1"/>
+                </a:solidFill>
+              </a:rPr>
+              <a:t> </a:t>
+            </a:r>
+            <a:r>
+              <a:rPr lang="pt-BR" sz="2000" dirty="0" err="1">
+                <a:solidFill>
+                  <a:schemeClr val="tx1"/>
+                </a:solidFill>
+              </a:rPr>
+              <a:t>algorithm</a:t>
+            </a:r>
+            <a:r>
+              <a:rPr lang="pt-BR" sz="2000" dirty="0">
+                <a:solidFill>
+                  <a:schemeClr val="tx1"/>
+                </a:solidFill>
+              </a:rPr>
+              <a:t> for </a:t>
+            </a:r>
+            <a:r>
+              <a:rPr lang="pt-BR" sz="2000" dirty="0" err="1">
+                <a:solidFill>
+                  <a:schemeClr val="tx1"/>
+                </a:solidFill>
+              </a:rPr>
+              <a:t>task</a:t>
+            </a:r>
+            <a:r>
+              <a:rPr lang="pt-BR" sz="2000" dirty="0">
+                <a:solidFill>
+                  <a:schemeClr val="tx1"/>
+                </a:solidFill>
+              </a:rPr>
+              <a:t> </a:t>
+            </a:r>
+            <a:r>
+              <a:rPr lang="pt-BR" sz="2000" dirty="0" err="1" smtClean="0">
+                <a:solidFill>
+                  <a:schemeClr val="tx1"/>
+                </a:solidFill>
+              </a:rPr>
+              <a:t>mapping</a:t>
+            </a:r>
+            <a:r>
+              <a:rPr lang="pt-BR" sz="2000" dirty="0">
+                <a:solidFill>
+                  <a:schemeClr val="tx1"/>
+                </a:solidFill>
+              </a:rPr>
+              <a:t> </a:t>
+            </a:r>
+            <a:r>
+              <a:rPr lang="pt-BR" sz="2000" dirty="0" err="1" smtClean="0">
+                <a:solidFill>
+                  <a:schemeClr val="tx1"/>
+                </a:solidFill>
+              </a:rPr>
+              <a:t>on</a:t>
+            </a:r>
+            <a:r>
+              <a:rPr lang="pt-BR" sz="2000" dirty="0" smtClean="0">
+                <a:solidFill>
+                  <a:schemeClr val="tx1"/>
+                </a:solidFill>
+              </a:rPr>
+              <a:t> </a:t>
+            </a:r>
+            <a:r>
+              <a:rPr lang="pt-BR" sz="2000" dirty="0" err="1">
+                <a:solidFill>
+                  <a:schemeClr val="tx1"/>
+                </a:solidFill>
+              </a:rPr>
+              <a:t>parallel</a:t>
+            </a:r>
+            <a:r>
+              <a:rPr lang="pt-BR" sz="2000" dirty="0">
+                <a:solidFill>
+                  <a:schemeClr val="tx1"/>
+                </a:solidFill>
+              </a:rPr>
+              <a:t> </a:t>
+            </a:r>
+            <a:r>
+              <a:rPr lang="pt-BR" sz="2000" dirty="0" err="1">
+                <a:solidFill>
+                  <a:schemeClr val="tx1"/>
+                </a:solidFill>
+              </a:rPr>
+              <a:t>machines</a:t>
+            </a:r>
+            <a:r>
+              <a:rPr lang="pt-BR" sz="2000" dirty="0">
+                <a:solidFill>
+                  <a:schemeClr val="tx1"/>
+                </a:solidFill>
+              </a:rPr>
+              <a:t>. 2000</a:t>
+            </a:r>
+            <a:r>
+              <a:rPr lang="pt-BR" sz="2000" dirty="0" smtClean="0">
+                <a:solidFill>
+                  <a:schemeClr val="tx1"/>
+                </a:solidFill>
+              </a:rPr>
+              <a:t>.</a:t>
+            </a:r>
+          </a:p>
+          <a:p>
+            <a:pPr marL="342900" indent="-342900">
+              <a:buFont typeface="Arial" charset="0"/>
+              <a:buChar char="•"/>
+            </a:pPr>
+            <a:r>
+              <a:rPr lang="pt-BR" sz="2000" dirty="0">
+                <a:solidFill>
+                  <a:schemeClr val="tx1"/>
+                </a:solidFill>
+              </a:rPr>
+              <a:t>LUCAS, D. C. Algoritmos </a:t>
+            </a:r>
+            <a:r>
+              <a:rPr lang="pt-BR" sz="2000" dirty="0" err="1" smtClean="0">
+                <a:solidFill>
+                  <a:schemeClr val="tx1"/>
+                </a:solidFill>
+              </a:rPr>
+              <a:t>gen</a:t>
+            </a:r>
+            <a:r>
+              <a:rPr lang="en-US" sz="2000" dirty="0" err="1" smtClean="0">
+                <a:solidFill>
+                  <a:schemeClr val="tx1"/>
+                </a:solidFill>
+              </a:rPr>
+              <a:t>é</a:t>
+            </a:r>
+            <a:r>
+              <a:rPr lang="pt-BR" sz="2000" dirty="0" smtClean="0">
+                <a:solidFill>
+                  <a:schemeClr val="tx1"/>
+                </a:solidFill>
+              </a:rPr>
+              <a:t>ticos</a:t>
+            </a:r>
+            <a:r>
+              <a:rPr lang="pt-BR" sz="2000" dirty="0">
+                <a:solidFill>
+                  <a:schemeClr val="tx1"/>
+                </a:solidFill>
+              </a:rPr>
+              <a:t>: uma </a:t>
+            </a:r>
+            <a:r>
+              <a:rPr lang="pt-BR" sz="2000" dirty="0" err="1" smtClean="0">
+                <a:solidFill>
+                  <a:schemeClr val="tx1"/>
+                </a:solidFill>
+              </a:rPr>
+              <a:t>introdu</a:t>
+            </a:r>
+            <a:r>
+              <a:rPr lang="en-US" sz="2000" dirty="0" err="1" smtClean="0">
+                <a:solidFill>
+                  <a:schemeClr val="tx1"/>
+                </a:solidFill>
+              </a:rPr>
+              <a:t>çã</a:t>
+            </a:r>
+            <a:r>
+              <a:rPr lang="pt-BR" sz="2000" dirty="0" smtClean="0">
+                <a:solidFill>
+                  <a:schemeClr val="tx1"/>
+                </a:solidFill>
+              </a:rPr>
+              <a:t>o</a:t>
+            </a:r>
+            <a:r>
+              <a:rPr lang="pt-BR" sz="2000" dirty="0">
+                <a:solidFill>
+                  <a:schemeClr val="tx1"/>
+                </a:solidFill>
+              </a:rPr>
+              <a:t>. </a:t>
+            </a:r>
+            <a:r>
+              <a:rPr lang="pt-BR" sz="2000" dirty="0" smtClean="0">
+                <a:solidFill>
+                  <a:schemeClr val="tx1"/>
+                </a:solidFill>
+              </a:rPr>
+              <a:t>Universidade </a:t>
+            </a:r>
+            <a:r>
+              <a:rPr lang="pt-BR" sz="2000" dirty="0">
+                <a:solidFill>
+                  <a:schemeClr val="tx1"/>
+                </a:solidFill>
+              </a:rPr>
+              <a:t>Federal do </a:t>
+            </a:r>
+            <a:r>
+              <a:rPr lang="pt-BR" sz="2000" dirty="0" smtClean="0">
+                <a:solidFill>
+                  <a:schemeClr val="tx1"/>
+                </a:solidFill>
+              </a:rPr>
+              <a:t>Rio Grande </a:t>
+            </a:r>
+            <a:r>
+              <a:rPr lang="pt-BR" sz="2000" dirty="0">
+                <a:solidFill>
+                  <a:schemeClr val="tx1"/>
+                </a:solidFill>
+              </a:rPr>
+              <a:t>do Sul, </a:t>
+            </a:r>
+            <a:r>
+              <a:rPr lang="pt-BR" sz="2000" dirty="0" smtClean="0">
+                <a:solidFill>
+                  <a:schemeClr val="tx1"/>
+                </a:solidFill>
+              </a:rPr>
+              <a:t>2002.</a:t>
+            </a:r>
+          </a:p>
+          <a:p>
+            <a:pPr marL="342900" indent="-342900">
+              <a:buFont typeface="Arial" charset="0"/>
+              <a:buChar char="•"/>
+            </a:pPr>
+            <a:r>
+              <a:rPr lang="pt-BR" sz="2000" dirty="0">
+                <a:solidFill>
+                  <a:schemeClr val="tx1"/>
+                </a:solidFill>
+              </a:rPr>
+              <a:t>MOLE, V. L. D. Algoritmos </a:t>
+            </a:r>
+            <a:r>
+              <a:rPr lang="pt-BR" sz="2000" dirty="0" err="1" smtClean="0">
+                <a:solidFill>
+                  <a:schemeClr val="tx1"/>
+                </a:solidFill>
+              </a:rPr>
+              <a:t>gen</a:t>
+            </a:r>
+            <a:r>
+              <a:rPr lang="en-US" sz="2000" dirty="0" err="1" smtClean="0">
+                <a:solidFill>
+                  <a:schemeClr val="tx1"/>
+                </a:solidFill>
+              </a:rPr>
+              <a:t>é</a:t>
+            </a:r>
+            <a:r>
+              <a:rPr lang="pt-BR" sz="2000" dirty="0" smtClean="0">
+                <a:solidFill>
+                  <a:schemeClr val="tx1"/>
+                </a:solidFill>
+              </a:rPr>
+              <a:t>ticos </a:t>
+            </a:r>
+            <a:r>
+              <a:rPr lang="pt-BR" sz="2000" dirty="0">
+                <a:solidFill>
+                  <a:schemeClr val="tx1"/>
+                </a:solidFill>
+              </a:rPr>
+              <a:t>– uma abordagem paralela baseada em </a:t>
+            </a:r>
+            <a:r>
+              <a:rPr lang="pt-BR" sz="2000" dirty="0" err="1" smtClean="0">
+                <a:solidFill>
+                  <a:schemeClr val="tx1"/>
+                </a:solidFill>
+              </a:rPr>
+              <a:t>popula</a:t>
+            </a:r>
+            <a:r>
+              <a:rPr lang="en-US" sz="2000" dirty="0" err="1" smtClean="0">
+                <a:solidFill>
+                  <a:schemeClr val="tx1"/>
+                </a:solidFill>
+              </a:rPr>
+              <a:t>çõ</a:t>
+            </a:r>
+            <a:r>
+              <a:rPr lang="pt-BR" sz="2000" dirty="0" smtClean="0">
+                <a:solidFill>
+                  <a:schemeClr val="tx1"/>
+                </a:solidFill>
+              </a:rPr>
+              <a:t>es cooperantes, 2002.</a:t>
+            </a:r>
+          </a:p>
+          <a:p>
+            <a:pPr marL="342900" indent="-342900">
               <a:buFont typeface="Arial" charset="0"/>
               <a:buChar char="•"/>
             </a:pPr>
@@ -9036,551 +9385,6 @@
               </a:rPr>
               <a:pPr/>
               <a:t>2</a:t>
-            </a:fld>
-            <a:endParaRPr lang="en-US" dirty="0">
-              <a:solidFill>
-                <a:schemeClr val="tx1"/>
-              </a:solidFill>
-            </a:endParaRPr>
-          </a:p>
-        </p:txBody>
-      </p:sp>
-      <p:sp>
-        <p:nvSpPr>
-          <p:cNvPr id="7" name="Espaço Reservado para Texto 2"/>
-          <p:cNvSpPr txBox="1">
-            <a:spLocks/>
-          </p:cNvSpPr>
-          <p:nvPr/>
-        </p:nvSpPr>
-        <p:spPr>
-          <a:xfrm>
-            <a:off x="9349386" y="403790"/>
-            <a:ext cx="5377374" cy="6315890"/>
-          </a:xfrm>
-          <a:prstGeom prst="rect">
-            <a:avLst/>
-          </a:prstGeom>
-        </p:spPr>
-        <p:txBody>
-          <a:bodyPr vert="horz" lIns="91440" tIns="45720" rIns="91440" bIns="45720" rtlCol="0" anchor="t">
-            <a:noAutofit/>
-          </a:bodyPr>
-          <a:lstStyle>
-            <a:lvl1pPr marL="0" indent="0" algn="l" defTabSz="457200" rtl="0" eaLnBrk="1" latinLnBrk="0" hangingPunct="1">
-              <a:spcBef>
-                <a:spcPct val="20000"/>
-              </a:spcBef>
-              <a:spcAft>
-                <a:spcPts val="600"/>
-              </a:spcAft>
-              <a:buClr>
-                <a:schemeClr val="tx1"/>
-              </a:buClr>
-              <a:buSzPct val="80000"/>
-              <a:buFont typeface="Wingdings 3" panose="05040102010807070707" pitchFamily="18" charset="2"/>
-              <a:buNone/>
-              <a:defRPr sz="1800" kern="1200" cap="none">
-                <a:solidFill>
-                  <a:schemeClr val="bg2">
-                    <a:lumMod val="75000"/>
-                  </a:schemeClr>
-                </a:solidFill>
-                <a:effectLst/>
-                <a:latin typeface="+mn-lt"/>
-                <a:ea typeface="+mn-ea"/>
-                <a:cs typeface="+mn-cs"/>
-              </a:defRPr>
-            </a:lvl1pPr>
-            <a:lvl2pPr marL="457200" indent="0" algn="l" defTabSz="457200" rtl="0" eaLnBrk="1" latinLnBrk="0" hangingPunct="1">
-              <a:spcBef>
-                <a:spcPct val="20000"/>
-              </a:spcBef>
-              <a:spcAft>
-                <a:spcPts val="600"/>
-              </a:spcAft>
-              <a:buClr>
-                <a:schemeClr val="tx1"/>
-              </a:buClr>
-              <a:buSzPct val="80000"/>
-              <a:buFont typeface="Wingdings 3" panose="05040102010807070707" pitchFamily="18" charset="2"/>
-              <a:buNone/>
-              <a:defRPr sz="1800" kern="1200" cap="none">
-                <a:solidFill>
-                  <a:schemeClr val="tx1">
-                    <a:tint val="75000"/>
-                  </a:schemeClr>
-                </a:solidFill>
-                <a:effectLst/>
-                <a:latin typeface="+mn-lt"/>
-                <a:ea typeface="+mn-ea"/>
-                <a:cs typeface="+mn-cs"/>
-              </a:defRPr>
-            </a:lvl2pPr>
-            <a:lvl3pPr marL="914400" indent="0" algn="l" defTabSz="457200" rtl="0" eaLnBrk="1" latinLnBrk="0" hangingPunct="1">
-              <a:spcBef>
-                <a:spcPct val="20000"/>
-              </a:spcBef>
-              <a:spcAft>
-                <a:spcPts val="600"/>
-              </a:spcAft>
-              <a:buClr>
-                <a:schemeClr val="tx1"/>
-              </a:buClr>
-              <a:buSzPct val="80000"/>
-              <a:buFont typeface="Wingdings 3" panose="05040102010807070707" pitchFamily="18" charset="2"/>
-              <a:buNone/>
-              <a:defRPr sz="1600" kern="1200" cap="none">
-                <a:solidFill>
-                  <a:schemeClr val="tx1">
-                    <a:tint val="75000"/>
-                  </a:schemeClr>
-                </a:solidFill>
-                <a:effectLst/>
-                <a:latin typeface="+mn-lt"/>
-                <a:ea typeface="+mn-ea"/>
-                <a:cs typeface="+mn-cs"/>
-              </a:defRPr>
-            </a:lvl3pPr>
-            <a:lvl4pPr marL="1371600" indent="0" algn="l" defTabSz="457200" rtl="0" eaLnBrk="1" latinLnBrk="0" hangingPunct="1">
-              <a:spcBef>
-                <a:spcPct val="20000"/>
-              </a:spcBef>
-              <a:spcAft>
-                <a:spcPts val="600"/>
-              </a:spcAft>
-              <a:buClr>
-                <a:schemeClr val="tx1"/>
-              </a:buClr>
-              <a:buSzPct val="80000"/>
-              <a:buFont typeface="Wingdings 3" panose="05040102010807070707" pitchFamily="18" charset="2"/>
-              <a:buNone/>
-              <a:defRPr sz="1400" kern="1200" cap="none">
-                <a:solidFill>
-                  <a:schemeClr val="tx1">
-                    <a:tint val="75000"/>
-                  </a:schemeClr>
-                </a:solidFill>
-                <a:effectLst/>
-                <a:latin typeface="+mn-lt"/>
-                <a:ea typeface="+mn-ea"/>
-                <a:cs typeface="+mn-cs"/>
-              </a:defRPr>
-            </a:lvl4pPr>
-            <a:lvl5pPr marL="1828800" indent="0" algn="l" defTabSz="457200" rtl="0" eaLnBrk="1" latinLnBrk="0" hangingPunct="1">
-              <a:spcBef>
-                <a:spcPct val="20000"/>
-              </a:spcBef>
-              <a:spcAft>
-                <a:spcPts val="600"/>
-              </a:spcAft>
-              <a:buClr>
-                <a:schemeClr val="tx1"/>
-              </a:buClr>
-              <a:buSzPct val="80000"/>
-              <a:buFont typeface="Wingdings 3" panose="05040102010807070707" pitchFamily="18" charset="2"/>
-              <a:buNone/>
-              <a:defRPr sz="1400" kern="1200" cap="none">
-                <a:solidFill>
-                  <a:schemeClr val="tx1">
-                    <a:tint val="75000"/>
-                  </a:schemeClr>
-                </a:solidFill>
-                <a:effectLst/>
-                <a:latin typeface="+mn-lt"/>
-                <a:ea typeface="+mn-ea"/>
-                <a:cs typeface="+mn-cs"/>
-              </a:defRPr>
-            </a:lvl5pPr>
-            <a:lvl6pPr marL="2286000" indent="0" algn="l" defTabSz="457200" rtl="0" eaLnBrk="1" latinLnBrk="0" hangingPunct="1">
-              <a:spcBef>
-                <a:spcPct val="20000"/>
-              </a:spcBef>
-              <a:spcAft>
-                <a:spcPts val="600"/>
-              </a:spcAft>
-              <a:buClr>
-                <a:schemeClr val="tx1"/>
-              </a:buClr>
-              <a:buSzPct val="80000"/>
-              <a:buFont typeface="Wingdings 3" panose="05040102010807070707" pitchFamily="18" charset="2"/>
-              <a:buNone/>
-              <a:defRPr sz="1400" kern="1200" cap="none">
-                <a:solidFill>
-                  <a:schemeClr val="tx1">
-                    <a:tint val="75000"/>
-                  </a:schemeClr>
-                </a:solidFill>
-                <a:effectLst/>
-                <a:latin typeface="+mn-lt"/>
-                <a:ea typeface="+mn-ea"/>
-                <a:cs typeface="+mn-cs"/>
-              </a:defRPr>
-            </a:lvl6pPr>
-            <a:lvl7pPr marL="2743200" indent="0" algn="l" defTabSz="457200" rtl="0" eaLnBrk="1" latinLnBrk="0" hangingPunct="1">
-              <a:spcBef>
-                <a:spcPct val="20000"/>
-              </a:spcBef>
-              <a:spcAft>
-                <a:spcPts val="600"/>
-              </a:spcAft>
-              <a:buClr>
-                <a:schemeClr val="tx1"/>
-              </a:buClr>
-              <a:buSzPct val="80000"/>
-              <a:buFont typeface="Wingdings 3" panose="05040102010807070707" pitchFamily="18" charset="2"/>
-              <a:buNone/>
-              <a:defRPr sz="1400" kern="1200" cap="none">
-                <a:solidFill>
-                  <a:schemeClr val="tx1">
-                    <a:tint val="75000"/>
-                  </a:schemeClr>
-                </a:solidFill>
-                <a:effectLst/>
-                <a:latin typeface="+mn-lt"/>
-                <a:ea typeface="+mn-ea"/>
-                <a:cs typeface="+mn-cs"/>
-              </a:defRPr>
-            </a:lvl7pPr>
-            <a:lvl8pPr marL="3200400" indent="0" algn="l" defTabSz="457200" rtl="0" eaLnBrk="1" latinLnBrk="0" hangingPunct="1">
-              <a:spcBef>
-                <a:spcPct val="20000"/>
-              </a:spcBef>
-              <a:spcAft>
-                <a:spcPts val="600"/>
-              </a:spcAft>
-              <a:buClr>
-                <a:schemeClr val="tx1"/>
-              </a:buClr>
-              <a:buSzPct val="80000"/>
-              <a:buFont typeface="Wingdings 3" panose="05040102010807070707" pitchFamily="18" charset="2"/>
-              <a:buNone/>
-              <a:defRPr sz="1400" kern="1200" cap="none">
-                <a:solidFill>
-                  <a:schemeClr val="tx1">
-                    <a:tint val="75000"/>
-                  </a:schemeClr>
-                </a:solidFill>
-                <a:effectLst/>
-                <a:latin typeface="+mn-lt"/>
-                <a:ea typeface="+mn-ea"/>
-                <a:cs typeface="+mn-cs"/>
-              </a:defRPr>
-            </a:lvl8pPr>
-            <a:lvl9pPr marL="3657600" indent="0" algn="l" defTabSz="457200" rtl="0" eaLnBrk="1" latinLnBrk="0" hangingPunct="1">
-              <a:spcBef>
-                <a:spcPct val="20000"/>
-              </a:spcBef>
-              <a:spcAft>
-                <a:spcPts val="600"/>
-              </a:spcAft>
-              <a:buClr>
-                <a:schemeClr val="tx1"/>
-              </a:buClr>
-              <a:buSzPct val="80000"/>
-              <a:buFont typeface="Wingdings 3" panose="05040102010807070707" pitchFamily="18" charset="2"/>
-              <a:buNone/>
-              <a:defRPr sz="1400" kern="1200" cap="none">
-                <a:solidFill>
-                  <a:schemeClr val="tx1">
-                    <a:tint val="75000"/>
-                  </a:schemeClr>
-                </a:solidFill>
-                <a:effectLst/>
-                <a:latin typeface="+mn-lt"/>
-                <a:ea typeface="+mn-ea"/>
-                <a:cs typeface="+mn-cs"/>
-              </a:defRPr>
-            </a:lvl9pPr>
-          </a:lstStyle>
-          <a:p>
-            <a:r>
-              <a:rPr lang="pt-BR" sz="1400" dirty="0">
-                <a:solidFill>
-                  <a:schemeClr val="tx1"/>
-                </a:solidFill>
-              </a:rPr>
-              <a:t>1. Busca de Caminho</a:t>
-            </a:r>
-          </a:p>
-          <a:p>
-            <a:r>
-              <a:rPr lang="pt-BR" sz="1400" dirty="0">
-                <a:solidFill>
-                  <a:schemeClr val="tx2"/>
-                </a:solidFill>
-              </a:rPr>
-              <a:t>2. Algoritmo A*</a:t>
-            </a:r>
-          </a:p>
-          <a:p>
-            <a:r>
-              <a:rPr lang="pt-BR" sz="1400" dirty="0">
-                <a:solidFill>
-                  <a:schemeClr val="tx1"/>
-                </a:solidFill>
-              </a:rPr>
-              <a:t>3. Algoritmo A*</a:t>
-            </a:r>
-          </a:p>
-          <a:p>
-            <a:r>
-              <a:rPr lang="pt-BR" sz="1400" dirty="0">
-                <a:solidFill>
-                  <a:schemeClr val="tx1"/>
-                </a:solidFill>
-              </a:rPr>
-              <a:t>4. Algoritmos Genéticos</a:t>
-            </a:r>
-          </a:p>
-          <a:p>
-            <a:r>
-              <a:rPr lang="pt-BR" sz="1400" dirty="0">
-                <a:solidFill>
-                  <a:schemeClr val="tx1"/>
-                </a:solidFill>
-              </a:rPr>
-              <a:t>5. Algoritmos Genéticos</a:t>
-            </a:r>
-          </a:p>
-          <a:p>
-            <a:r>
-              <a:rPr lang="pt-BR" sz="1400" dirty="0">
-                <a:solidFill>
-                  <a:schemeClr val="tx1"/>
-                </a:solidFill>
-              </a:rPr>
-              <a:t>6. Algoritmos Genéticos e A*</a:t>
-            </a:r>
-          </a:p>
-          <a:p>
-            <a:r>
-              <a:rPr lang="pt-BR" sz="1400" dirty="0">
-                <a:solidFill>
-                  <a:schemeClr val="tx1"/>
-                </a:solidFill>
-              </a:rPr>
-              <a:t>7. Objetivos</a:t>
-            </a:r>
-          </a:p>
-          <a:p>
-            <a:r>
-              <a:rPr lang="pt-BR" sz="1400" dirty="0">
-                <a:solidFill>
-                  <a:schemeClr val="tx1"/>
-                </a:solidFill>
-              </a:rPr>
-              <a:t>8. O Modelo</a:t>
-            </a:r>
-          </a:p>
-          <a:p>
-            <a:r>
-              <a:rPr lang="pt-BR" sz="1400" dirty="0">
-                <a:solidFill>
-                  <a:schemeClr val="tx1"/>
-                </a:solidFill>
-              </a:rPr>
-              <a:t>9. Disciplinas contribuíram</a:t>
-            </a:r>
-          </a:p>
-          <a:p>
-            <a:r>
-              <a:rPr lang="pt-BR" sz="1400" dirty="0">
-                <a:solidFill>
-                  <a:schemeClr val="tx1"/>
-                </a:solidFill>
-              </a:rPr>
-              <a:t>10. Referencias</a:t>
-            </a:r>
-          </a:p>
-          <a:p>
-            <a:r>
-              <a:rPr lang="pt-BR" sz="1400" dirty="0">
-                <a:solidFill>
-                  <a:schemeClr val="tx1"/>
-                </a:solidFill>
-              </a:rPr>
-              <a:t>11. Agradecimentos</a:t>
-            </a:r>
-          </a:p>
-          <a:p>
-            <a:r>
-              <a:rPr lang="pt-BR" sz="1400" dirty="0">
-                <a:solidFill>
-                  <a:schemeClr val="tx1"/>
-                </a:solidFill>
-              </a:rPr>
-              <a:t>12. Perguntas</a:t>
-            </a:r>
-          </a:p>
-        </p:txBody>
-      </p:sp>
-      <p:sp>
-        <p:nvSpPr>
-          <p:cNvPr id="8" name="CaixaDeTexto 7"/>
-          <p:cNvSpPr txBox="1"/>
-          <p:nvPr/>
-        </p:nvSpPr>
-        <p:spPr>
-          <a:xfrm>
-            <a:off x="684212" y="1162730"/>
-            <a:ext cx="2545890" cy="461665"/>
-          </a:xfrm>
-          <a:prstGeom prst="rect">
-            <a:avLst/>
-          </a:prstGeom>
-          <a:noFill/>
-        </p:spPr>
-        <p:txBody>
-          <a:bodyPr wrap="none" rtlCol="0">
-            <a:spAutoFit/>
-          </a:bodyPr>
-          <a:lstStyle/>
-          <a:p>
-            <a:pPr marL="285750" indent="-285750">
-              <a:buFont typeface="Arial" charset="0"/>
-              <a:buChar char="•"/>
-            </a:pPr>
-            <a:r>
-              <a:rPr lang="pt-BR" sz="2400" dirty="0" smtClean="0"/>
-              <a:t>Por </a:t>
-            </a:r>
-            <a:r>
-              <a:rPr lang="pt-BR" sz="2400" dirty="0"/>
-              <a:t>que o A</a:t>
-            </a:r>
-            <a:r>
-              <a:rPr lang="pt-BR" sz="2400" dirty="0" smtClean="0"/>
-              <a:t>*?</a:t>
-            </a:r>
-          </a:p>
-        </p:txBody>
-      </p:sp>
-      <p:pic>
-        <p:nvPicPr>
-          <p:cNvPr id="3" name="Imagem 2"/>
-          <p:cNvPicPr>
-            <a:picLocks noChangeAspect="1"/>
-          </p:cNvPicPr>
-          <p:nvPr/>
-        </p:nvPicPr>
-        <p:blipFill>
-          <a:blip r:embed="rId2">
-            <a:extLst>
-              <a:ext uri="{28A0092B-C50C-407E-A947-70E740481C1C}">
-                <a14:useLocalDpi xmlns:a14="http://schemas.microsoft.com/office/drawing/2010/main" val="0"/>
-              </a:ext>
-            </a:extLst>
-          </a:blip>
-          <a:stretch>
-            <a:fillRect/>
-          </a:stretch>
-        </p:blipFill>
-        <p:spPr>
-          <a:xfrm>
-            <a:off x="719206" y="1624395"/>
-            <a:ext cx="5021792" cy="4957684"/>
-          </a:xfrm>
-          <a:prstGeom prst="rect">
-            <a:avLst/>
-          </a:prstGeom>
-        </p:spPr>
-      </p:pic>
-    </p:spTree>
-    <p:extLst>
-      <p:ext uri="{BB962C8B-B14F-4D97-AF65-F5344CB8AC3E}">
-        <p14:creationId xmlns:p14="http://schemas.microsoft.com/office/powerpoint/2010/main" val="1791269301"/>
-      </p:ext>
-    </p:extLst>
-  </p:cSld>
-  <p:clrMapOvr>
-    <a:masterClrMapping/>
-  </p:clrMapOvr>
-  <p:timing>
-    <p:tnLst>
-      <p:par>
-        <p:cTn id="1" dur="indefinite" restart="never" nodeType="tmRoot"/>
-      </p:par>
-    </p:tnLst>
-  </p:timing>
-</p:sld>
-</file>
-
-<file path=ppt/slides/slide4.xml><?xml version="1.0" encoding="utf-8"?>
-<p:sld xmlns:a="http://schemas.openxmlformats.org/drawingml/2006/main" xmlns:r="http://schemas.openxmlformats.org/officeDocument/2006/relationships" xmlns:p="http://schemas.openxmlformats.org/presentationml/2006/main">
-  <p:cSld>
-    <p:spTree>
-      <p:nvGrpSpPr>
-        <p:cNvPr id="1" name=""/>
-        <p:cNvGrpSpPr/>
-        <p:nvPr/>
-      </p:nvGrpSpPr>
-      <p:grpSpPr>
-        <a:xfrm>
-          <a:off x="0" y="0"/>
-          <a:ext cx="0" cy="0"/>
-          <a:chOff x="0" y="0"/>
-          <a:chExt cx="0" cy="0"/>
-        </a:xfrm>
-      </p:grpSpPr>
-      <p:sp>
-        <p:nvSpPr>
-          <p:cNvPr id="2" name="Título 1"/>
-          <p:cNvSpPr>
-            <a:spLocks noGrp="1"/>
-          </p:cNvSpPr>
-          <p:nvPr>
-            <p:ph type="title"/>
-          </p:nvPr>
-        </p:nvSpPr>
-        <p:spPr>
-          <a:xfrm>
-            <a:off x="684212" y="103239"/>
-            <a:ext cx="8415543" cy="778084"/>
-          </a:xfrm>
-        </p:spPr>
-        <p:txBody>
-          <a:bodyPr>
-            <a:normAutofit/>
-          </a:bodyPr>
-          <a:lstStyle/>
-          <a:p>
-            <a:r>
-              <a:rPr lang="pt-BR" dirty="0" smtClean="0"/>
-              <a:t>Algoritmo A*</a:t>
-            </a:r>
-            <a:endParaRPr lang="pt-BR" dirty="0"/>
-          </a:p>
-        </p:txBody>
-      </p:sp>
-      <p:sp>
-        <p:nvSpPr>
-          <p:cNvPr id="6" name="Espaço Reservado para Número de Slide 5"/>
-          <p:cNvSpPr>
-            <a:spLocks noGrp="1"/>
-          </p:cNvSpPr>
-          <p:nvPr>
-            <p:ph type="sldNum" sz="quarter" idx="12"/>
-          </p:nvPr>
-        </p:nvSpPr>
-        <p:spPr>
-          <a:xfrm>
-            <a:off x="10895828" y="6049755"/>
-            <a:ext cx="1142245" cy="669925"/>
-          </a:xfrm>
-        </p:spPr>
-        <p:txBody>
-          <a:bodyPr/>
-          <a:lstStyle/>
-          <a:p>
-            <a:fld id="{D57F1E4F-1CFF-5643-939E-217C01CDF565}" type="slidenum">
-              <a:rPr lang="en-US" smtClean="0">
-                <a:solidFill>
-                  <a:schemeClr val="tx1"/>
-                </a:solidFill>
-              </a:rPr>
-              <a:pPr/>
-              <a:t>3</a:t>
             </a:fld>
             <a:endParaRPr lang="en-US" dirty="0">
               <a:solidFill>
@@ -10093,6 +9897,551 @@
 </p:sld>
 </file>
 
+<file path=ppt/slides/slide4.xml><?xml version="1.0" encoding="utf-8"?>
+<p:sld xmlns:a="http://schemas.openxmlformats.org/drawingml/2006/main" xmlns:r="http://schemas.openxmlformats.org/officeDocument/2006/relationships" xmlns:p="http://schemas.openxmlformats.org/presentationml/2006/main">
+  <p:cSld>
+    <p:spTree>
+      <p:nvGrpSpPr>
+        <p:cNvPr id="1" name=""/>
+        <p:cNvGrpSpPr/>
+        <p:nvPr/>
+      </p:nvGrpSpPr>
+      <p:grpSpPr>
+        <a:xfrm>
+          <a:off x="0" y="0"/>
+          <a:ext cx="0" cy="0"/>
+          <a:chOff x="0" y="0"/>
+          <a:chExt cx="0" cy="0"/>
+        </a:xfrm>
+      </p:grpSpPr>
+      <p:sp>
+        <p:nvSpPr>
+          <p:cNvPr id="2" name="Título 1"/>
+          <p:cNvSpPr>
+            <a:spLocks noGrp="1"/>
+          </p:cNvSpPr>
+          <p:nvPr>
+            <p:ph type="title"/>
+          </p:nvPr>
+        </p:nvSpPr>
+        <p:spPr>
+          <a:xfrm>
+            <a:off x="684212" y="103239"/>
+            <a:ext cx="8415543" cy="778084"/>
+          </a:xfrm>
+        </p:spPr>
+        <p:txBody>
+          <a:bodyPr>
+            <a:normAutofit/>
+          </a:bodyPr>
+          <a:lstStyle/>
+          <a:p>
+            <a:r>
+              <a:rPr lang="pt-BR" dirty="0" smtClean="0"/>
+              <a:t>Algoritmo A*</a:t>
+            </a:r>
+            <a:endParaRPr lang="pt-BR" dirty="0"/>
+          </a:p>
+        </p:txBody>
+      </p:sp>
+      <p:sp>
+        <p:nvSpPr>
+          <p:cNvPr id="6" name="Espaço Reservado para Número de Slide 5"/>
+          <p:cNvSpPr>
+            <a:spLocks noGrp="1"/>
+          </p:cNvSpPr>
+          <p:nvPr>
+            <p:ph type="sldNum" sz="quarter" idx="12"/>
+          </p:nvPr>
+        </p:nvSpPr>
+        <p:spPr>
+          <a:xfrm>
+            <a:off x="10895828" y="6049755"/>
+            <a:ext cx="1142245" cy="669925"/>
+          </a:xfrm>
+        </p:spPr>
+        <p:txBody>
+          <a:bodyPr/>
+          <a:lstStyle/>
+          <a:p>
+            <a:fld id="{D57F1E4F-1CFF-5643-939E-217C01CDF565}" type="slidenum">
+              <a:rPr lang="en-US" smtClean="0">
+                <a:solidFill>
+                  <a:schemeClr val="tx1"/>
+                </a:solidFill>
+              </a:rPr>
+              <a:pPr/>
+              <a:t>3</a:t>
+            </a:fld>
+            <a:endParaRPr lang="en-US" dirty="0">
+              <a:solidFill>
+                <a:schemeClr val="tx1"/>
+              </a:solidFill>
+            </a:endParaRPr>
+          </a:p>
+        </p:txBody>
+      </p:sp>
+      <p:sp>
+        <p:nvSpPr>
+          <p:cNvPr id="7" name="Espaço Reservado para Texto 2"/>
+          <p:cNvSpPr txBox="1">
+            <a:spLocks/>
+          </p:cNvSpPr>
+          <p:nvPr/>
+        </p:nvSpPr>
+        <p:spPr>
+          <a:xfrm>
+            <a:off x="9349386" y="403790"/>
+            <a:ext cx="5377374" cy="6315890"/>
+          </a:xfrm>
+          <a:prstGeom prst="rect">
+            <a:avLst/>
+          </a:prstGeom>
+        </p:spPr>
+        <p:txBody>
+          <a:bodyPr vert="horz" lIns="91440" tIns="45720" rIns="91440" bIns="45720" rtlCol="0" anchor="t">
+            <a:noAutofit/>
+          </a:bodyPr>
+          <a:lstStyle>
+            <a:lvl1pPr marL="0" indent="0" algn="l" defTabSz="457200" rtl="0" eaLnBrk="1" latinLnBrk="0" hangingPunct="1">
+              <a:spcBef>
+                <a:spcPct val="20000"/>
+              </a:spcBef>
+              <a:spcAft>
+                <a:spcPts val="600"/>
+              </a:spcAft>
+              <a:buClr>
+                <a:schemeClr val="tx1"/>
+              </a:buClr>
+              <a:buSzPct val="80000"/>
+              <a:buFont typeface="Wingdings 3" panose="05040102010807070707" pitchFamily="18" charset="2"/>
+              <a:buNone/>
+              <a:defRPr sz="1800" kern="1200" cap="none">
+                <a:solidFill>
+                  <a:schemeClr val="bg2">
+                    <a:lumMod val="75000"/>
+                  </a:schemeClr>
+                </a:solidFill>
+                <a:effectLst/>
+                <a:latin typeface="+mn-lt"/>
+                <a:ea typeface="+mn-ea"/>
+                <a:cs typeface="+mn-cs"/>
+              </a:defRPr>
+            </a:lvl1pPr>
+            <a:lvl2pPr marL="457200" indent="0" algn="l" defTabSz="457200" rtl="0" eaLnBrk="1" latinLnBrk="0" hangingPunct="1">
+              <a:spcBef>
+                <a:spcPct val="20000"/>
+              </a:spcBef>
+              <a:spcAft>
+                <a:spcPts val="600"/>
+              </a:spcAft>
+              <a:buClr>
+                <a:schemeClr val="tx1"/>
+              </a:buClr>
+              <a:buSzPct val="80000"/>
+              <a:buFont typeface="Wingdings 3" panose="05040102010807070707" pitchFamily="18" charset="2"/>
+              <a:buNone/>
+              <a:defRPr sz="1800" kern="1200" cap="none">
+                <a:solidFill>
+                  <a:schemeClr val="tx1">
+                    <a:tint val="75000"/>
+                  </a:schemeClr>
+                </a:solidFill>
+                <a:effectLst/>
+                <a:latin typeface="+mn-lt"/>
+                <a:ea typeface="+mn-ea"/>
+                <a:cs typeface="+mn-cs"/>
+              </a:defRPr>
+            </a:lvl2pPr>
+            <a:lvl3pPr marL="914400" indent="0" algn="l" defTabSz="457200" rtl="0" eaLnBrk="1" latinLnBrk="0" hangingPunct="1">
+              <a:spcBef>
+                <a:spcPct val="20000"/>
+              </a:spcBef>
+              <a:spcAft>
+                <a:spcPts val="600"/>
+              </a:spcAft>
+              <a:buClr>
+                <a:schemeClr val="tx1"/>
+              </a:buClr>
+              <a:buSzPct val="80000"/>
+              <a:buFont typeface="Wingdings 3" panose="05040102010807070707" pitchFamily="18" charset="2"/>
+              <a:buNone/>
+              <a:defRPr sz="1600" kern="1200" cap="none">
+                <a:solidFill>
+                  <a:schemeClr val="tx1">
+                    <a:tint val="75000"/>
+                  </a:schemeClr>
+                </a:solidFill>
+                <a:effectLst/>
+                <a:latin typeface="+mn-lt"/>
+                <a:ea typeface="+mn-ea"/>
+                <a:cs typeface="+mn-cs"/>
+              </a:defRPr>
+            </a:lvl3pPr>
+            <a:lvl4pPr marL="1371600" indent="0" algn="l" defTabSz="457200" rtl="0" eaLnBrk="1" latinLnBrk="0" hangingPunct="1">
+              <a:spcBef>
+                <a:spcPct val="20000"/>
+              </a:spcBef>
+              <a:spcAft>
+                <a:spcPts val="600"/>
+              </a:spcAft>
+              <a:buClr>
+                <a:schemeClr val="tx1"/>
+              </a:buClr>
+              <a:buSzPct val="80000"/>
+              <a:buFont typeface="Wingdings 3" panose="05040102010807070707" pitchFamily="18" charset="2"/>
+              <a:buNone/>
+              <a:defRPr sz="1400" kern="1200" cap="none">
+                <a:solidFill>
+                  <a:schemeClr val="tx1">
+                    <a:tint val="75000"/>
+                  </a:schemeClr>
+                </a:solidFill>
+                <a:effectLst/>
+                <a:latin typeface="+mn-lt"/>
+                <a:ea typeface="+mn-ea"/>
+                <a:cs typeface="+mn-cs"/>
+              </a:defRPr>
+            </a:lvl4pPr>
+            <a:lvl5pPr marL="1828800" indent="0" algn="l" defTabSz="457200" rtl="0" eaLnBrk="1" latinLnBrk="0" hangingPunct="1">
+              <a:spcBef>
+                <a:spcPct val="20000"/>
+              </a:spcBef>
+              <a:spcAft>
+                <a:spcPts val="600"/>
+              </a:spcAft>
+              <a:buClr>
+                <a:schemeClr val="tx1"/>
+              </a:buClr>
+              <a:buSzPct val="80000"/>
+              <a:buFont typeface="Wingdings 3" panose="05040102010807070707" pitchFamily="18" charset="2"/>
+              <a:buNone/>
+              <a:defRPr sz="1400" kern="1200" cap="none">
+                <a:solidFill>
+                  <a:schemeClr val="tx1">
+                    <a:tint val="75000"/>
+                  </a:schemeClr>
+                </a:solidFill>
+                <a:effectLst/>
+                <a:latin typeface="+mn-lt"/>
+                <a:ea typeface="+mn-ea"/>
+                <a:cs typeface="+mn-cs"/>
+              </a:defRPr>
+            </a:lvl5pPr>
+            <a:lvl6pPr marL="2286000" indent="0" algn="l" defTabSz="457200" rtl="0" eaLnBrk="1" latinLnBrk="0" hangingPunct="1">
+              <a:spcBef>
+                <a:spcPct val="20000"/>
+              </a:spcBef>
+              <a:spcAft>
+                <a:spcPts val="600"/>
+              </a:spcAft>
+              <a:buClr>
+                <a:schemeClr val="tx1"/>
+              </a:buClr>
+              <a:buSzPct val="80000"/>
+              <a:buFont typeface="Wingdings 3" panose="05040102010807070707" pitchFamily="18" charset="2"/>
+              <a:buNone/>
+              <a:defRPr sz="1400" kern="1200" cap="none">
+                <a:solidFill>
+                  <a:schemeClr val="tx1">
+                    <a:tint val="75000"/>
+                  </a:schemeClr>
+                </a:solidFill>
+                <a:effectLst/>
+                <a:latin typeface="+mn-lt"/>
+                <a:ea typeface="+mn-ea"/>
+                <a:cs typeface="+mn-cs"/>
+              </a:defRPr>
+            </a:lvl6pPr>
+            <a:lvl7pPr marL="2743200" indent="0" algn="l" defTabSz="457200" rtl="0" eaLnBrk="1" latinLnBrk="0" hangingPunct="1">
+              <a:spcBef>
+                <a:spcPct val="20000"/>
+              </a:spcBef>
+              <a:spcAft>
+                <a:spcPts val="600"/>
+              </a:spcAft>
+              <a:buClr>
+                <a:schemeClr val="tx1"/>
+              </a:buClr>
+              <a:buSzPct val="80000"/>
+              <a:buFont typeface="Wingdings 3" panose="05040102010807070707" pitchFamily="18" charset="2"/>
+              <a:buNone/>
+              <a:defRPr sz="1400" kern="1200" cap="none">
+                <a:solidFill>
+                  <a:schemeClr val="tx1">
+                    <a:tint val="75000"/>
+                  </a:schemeClr>
+                </a:solidFill>
+                <a:effectLst/>
+                <a:latin typeface="+mn-lt"/>
+                <a:ea typeface="+mn-ea"/>
+                <a:cs typeface="+mn-cs"/>
+              </a:defRPr>
+            </a:lvl7pPr>
+            <a:lvl8pPr marL="3200400" indent="0" algn="l" defTabSz="457200" rtl="0" eaLnBrk="1" latinLnBrk="0" hangingPunct="1">
+              <a:spcBef>
+                <a:spcPct val="20000"/>
+              </a:spcBef>
+              <a:spcAft>
+                <a:spcPts val="600"/>
+              </a:spcAft>
+              <a:buClr>
+                <a:schemeClr val="tx1"/>
+              </a:buClr>
+              <a:buSzPct val="80000"/>
+              <a:buFont typeface="Wingdings 3" panose="05040102010807070707" pitchFamily="18" charset="2"/>
+              <a:buNone/>
+              <a:defRPr sz="1400" kern="1200" cap="none">
+                <a:solidFill>
+                  <a:schemeClr val="tx1">
+                    <a:tint val="75000"/>
+                  </a:schemeClr>
+                </a:solidFill>
+                <a:effectLst/>
+                <a:latin typeface="+mn-lt"/>
+                <a:ea typeface="+mn-ea"/>
+                <a:cs typeface="+mn-cs"/>
+              </a:defRPr>
+            </a:lvl8pPr>
+            <a:lvl9pPr marL="3657600" indent="0" algn="l" defTabSz="457200" rtl="0" eaLnBrk="1" latinLnBrk="0" hangingPunct="1">
+              <a:spcBef>
+                <a:spcPct val="20000"/>
+              </a:spcBef>
+              <a:spcAft>
+                <a:spcPts val="600"/>
+              </a:spcAft>
+              <a:buClr>
+                <a:schemeClr val="tx1"/>
+              </a:buClr>
+              <a:buSzPct val="80000"/>
+              <a:buFont typeface="Wingdings 3" panose="05040102010807070707" pitchFamily="18" charset="2"/>
+              <a:buNone/>
+              <a:defRPr sz="1400" kern="1200" cap="none">
+                <a:solidFill>
+                  <a:schemeClr val="tx1">
+                    <a:tint val="75000"/>
+                  </a:schemeClr>
+                </a:solidFill>
+                <a:effectLst/>
+                <a:latin typeface="+mn-lt"/>
+                <a:ea typeface="+mn-ea"/>
+                <a:cs typeface="+mn-cs"/>
+              </a:defRPr>
+            </a:lvl9pPr>
+          </a:lstStyle>
+          <a:p>
+            <a:r>
+              <a:rPr lang="pt-BR" sz="1400" dirty="0">
+                <a:solidFill>
+                  <a:schemeClr val="tx1"/>
+                </a:solidFill>
+              </a:rPr>
+              <a:t>1. Busca de Caminho</a:t>
+            </a:r>
+          </a:p>
+          <a:p>
+            <a:r>
+              <a:rPr lang="pt-BR" sz="1400" dirty="0">
+                <a:solidFill>
+                  <a:schemeClr val="tx2"/>
+                </a:solidFill>
+              </a:rPr>
+              <a:t>2. Algoritmo A*</a:t>
+            </a:r>
+          </a:p>
+          <a:p>
+            <a:r>
+              <a:rPr lang="pt-BR" sz="1400" dirty="0">
+                <a:solidFill>
+                  <a:schemeClr val="tx1"/>
+                </a:solidFill>
+              </a:rPr>
+              <a:t>3. Algoritmo A*</a:t>
+            </a:r>
+          </a:p>
+          <a:p>
+            <a:r>
+              <a:rPr lang="pt-BR" sz="1400" dirty="0">
+                <a:solidFill>
+                  <a:schemeClr val="tx1"/>
+                </a:solidFill>
+              </a:rPr>
+              <a:t>4. Algoritmos Genéticos</a:t>
+            </a:r>
+          </a:p>
+          <a:p>
+            <a:r>
+              <a:rPr lang="pt-BR" sz="1400" dirty="0">
+                <a:solidFill>
+                  <a:schemeClr val="tx1"/>
+                </a:solidFill>
+              </a:rPr>
+              <a:t>5. Algoritmos Genéticos</a:t>
+            </a:r>
+          </a:p>
+          <a:p>
+            <a:r>
+              <a:rPr lang="pt-BR" sz="1400" dirty="0">
+                <a:solidFill>
+                  <a:schemeClr val="tx1"/>
+                </a:solidFill>
+              </a:rPr>
+              <a:t>6. Algoritmos Genéticos e A*</a:t>
+            </a:r>
+          </a:p>
+          <a:p>
+            <a:r>
+              <a:rPr lang="pt-BR" sz="1400" dirty="0">
+                <a:solidFill>
+                  <a:schemeClr val="tx1"/>
+                </a:solidFill>
+              </a:rPr>
+              <a:t>7. Objetivos</a:t>
+            </a:r>
+          </a:p>
+          <a:p>
+            <a:r>
+              <a:rPr lang="pt-BR" sz="1400" dirty="0">
+                <a:solidFill>
+                  <a:schemeClr val="tx1"/>
+                </a:solidFill>
+              </a:rPr>
+              <a:t>8. O Modelo</a:t>
+            </a:r>
+          </a:p>
+          <a:p>
+            <a:r>
+              <a:rPr lang="pt-BR" sz="1400" dirty="0">
+                <a:solidFill>
+                  <a:schemeClr val="tx1"/>
+                </a:solidFill>
+              </a:rPr>
+              <a:t>9. Disciplinas contribuíram</a:t>
+            </a:r>
+          </a:p>
+          <a:p>
+            <a:r>
+              <a:rPr lang="pt-BR" sz="1400" dirty="0">
+                <a:solidFill>
+                  <a:schemeClr val="tx1"/>
+                </a:solidFill>
+              </a:rPr>
+              <a:t>10. Referencias</a:t>
+            </a:r>
+          </a:p>
+          <a:p>
+            <a:r>
+              <a:rPr lang="pt-BR" sz="1400" dirty="0">
+                <a:solidFill>
+                  <a:schemeClr val="tx1"/>
+                </a:solidFill>
+              </a:rPr>
+              <a:t>11. Agradecimentos</a:t>
+            </a:r>
+          </a:p>
+          <a:p>
+            <a:r>
+              <a:rPr lang="pt-BR" sz="1400" dirty="0">
+                <a:solidFill>
+                  <a:schemeClr val="tx1"/>
+                </a:solidFill>
+              </a:rPr>
+              <a:t>12. Perguntas</a:t>
+            </a:r>
+          </a:p>
+        </p:txBody>
+      </p:sp>
+      <p:sp>
+        <p:nvSpPr>
+          <p:cNvPr id="8" name="CaixaDeTexto 7"/>
+          <p:cNvSpPr txBox="1"/>
+          <p:nvPr/>
+        </p:nvSpPr>
+        <p:spPr>
+          <a:xfrm>
+            <a:off x="684212" y="1162730"/>
+            <a:ext cx="2545890" cy="461665"/>
+          </a:xfrm>
+          <a:prstGeom prst="rect">
+            <a:avLst/>
+          </a:prstGeom>
+          <a:noFill/>
+        </p:spPr>
+        <p:txBody>
+          <a:bodyPr wrap="none" rtlCol="0">
+            <a:spAutoFit/>
+          </a:bodyPr>
+          <a:lstStyle/>
+          <a:p>
+            <a:pPr marL="285750" indent="-285750">
+              <a:buFont typeface="Arial" charset="0"/>
+              <a:buChar char="•"/>
+            </a:pPr>
+            <a:r>
+              <a:rPr lang="pt-BR" sz="2400" dirty="0" smtClean="0"/>
+              <a:t>Por </a:t>
+            </a:r>
+            <a:r>
+              <a:rPr lang="pt-BR" sz="2400" dirty="0"/>
+              <a:t>que o A</a:t>
+            </a:r>
+            <a:r>
+              <a:rPr lang="pt-BR" sz="2400" dirty="0" smtClean="0"/>
+              <a:t>*?</a:t>
+            </a:r>
+          </a:p>
+        </p:txBody>
+      </p:sp>
+      <p:pic>
+        <p:nvPicPr>
+          <p:cNvPr id="3" name="Imagem 2"/>
+          <p:cNvPicPr>
+            <a:picLocks noChangeAspect="1"/>
+          </p:cNvPicPr>
+          <p:nvPr/>
+        </p:nvPicPr>
+        <p:blipFill>
+          <a:blip r:embed="rId2">
+            <a:extLst>
+              <a:ext uri="{28A0092B-C50C-407E-A947-70E740481C1C}">
+                <a14:useLocalDpi xmlns:a14="http://schemas.microsoft.com/office/drawing/2010/main" val="0"/>
+              </a:ext>
+            </a:extLst>
+          </a:blip>
+          <a:stretch>
+            <a:fillRect/>
+          </a:stretch>
+        </p:blipFill>
+        <p:spPr>
+          <a:xfrm>
+            <a:off x="719206" y="1624395"/>
+            <a:ext cx="5021792" cy="4957684"/>
+          </a:xfrm>
+          <a:prstGeom prst="rect">
+            <a:avLst/>
+          </a:prstGeom>
+        </p:spPr>
+      </p:pic>
+    </p:spTree>
+    <p:extLst>
+      <p:ext uri="{BB962C8B-B14F-4D97-AF65-F5344CB8AC3E}">
+        <p14:creationId xmlns:p14="http://schemas.microsoft.com/office/powerpoint/2010/main" val="1791269301"/>
+      </p:ext>
+    </p:extLst>
+  </p:cSld>
+  <p:clrMapOvr>
+    <a:masterClrMapping/>
+  </p:clrMapOvr>
+  <p:timing>
+    <p:tnLst>
+      <p:par>
+        <p:cTn id="1" dur="indefinite" restart="never" nodeType="tmRoot"/>
+      </p:par>
+    </p:tnLst>
+  </p:timing>
+</p:sld>
+</file>
+
 <file path=ppt/slides/slide5.xml><?xml version="1.0" encoding="utf-8"?>
 <p:sld xmlns:a="http://schemas.openxmlformats.org/drawingml/2006/main" xmlns:r="http://schemas.openxmlformats.org/officeDocument/2006/relationships" xmlns:p="http://schemas.openxmlformats.org/presentationml/2006/main">
   <p:cSld>
@@ -10560,7 +10909,7 @@
         <p:spPr>
           <a:xfrm>
             <a:off x="684212" y="1162730"/>
-            <a:ext cx="3558988" cy="461665"/>
+            <a:ext cx="3558988" cy="830997"/>
           </a:xfrm>
           <a:prstGeom prst="rect">
             <a:avLst/>
@@ -10572,6 +10921,25 @@
             <a:spAutoFit/>
           </a:bodyPr>
           <a:lstStyle/>
+          <a:p>
+            <a:pPr marL="285750" indent="-285750">
+              <a:buFont typeface="Arial" charset="0"/>
+              <a:buChar char="•"/>
+            </a:pPr>
+            <a:r>
+              <a:rPr lang="pt-BR" sz="2400" dirty="0" smtClean="0"/>
+              <a:t>O que </a:t>
+            </a:r>
+            <a:r>
+              <a:rPr lang="en-US" sz="2400" dirty="0" err="1" smtClean="0"/>
+              <a:t>é</a:t>
+            </a:r>
+            <a:r>
+              <a:rPr lang="en-US" sz="2400" dirty="0" smtClean="0"/>
+              <a:t>?</a:t>
+            </a:r>
+            <a:endParaRPr lang="pt-BR" sz="2400" dirty="0" smtClean="0"/>
+          </a:p>
           <a:p>
             <a:pPr marL="285750" indent="-285750">
               <a:buFont typeface="Arial" charset="0"/>
@@ -10644,7 +11012,7 @@
         </p:blipFill>
         <p:spPr>
           <a:xfrm>
-            <a:off x="846648" y="1905802"/>
+            <a:off x="684212" y="3777465"/>
             <a:ext cx="1952786" cy="2743200"/>
           </a:xfrm>
           <a:prstGeom prst="rect">
@@ -11238,7 +11606,6 @@
               <a:rPr lang="pt-BR" sz="2400" dirty="0" smtClean="0"/>
               <a:t>Positivos?</a:t>
             </a:r>
-            <a:endParaRPr lang="pt-BR" sz="2400" dirty="0" smtClean="0"/>
           </a:p>
           <a:p>
             <a:pPr marL="285750" indent="-285750">
@@ -11249,7 +11616,6 @@
               <a:rPr lang="pt-BR" sz="2400" dirty="0" smtClean="0"/>
               <a:t>Quais os pontos negativos?</a:t>
             </a:r>
-            <a:endParaRPr lang="pt-BR" sz="2400" dirty="0" smtClean="0"/>
           </a:p>
         </p:txBody>
       </p:sp>
@@ -11314,11 +11680,7 @@
           <a:p>
             <a:r>
               <a:rPr lang="pt-BR" dirty="0" smtClean="0"/>
-              <a:t>algoritmo </a:t>
-            </a:r>
-            <a:r>
-              <a:rPr lang="pt-BR" dirty="0" smtClean="0"/>
-              <a:t>genético </a:t>
+              <a:t>algoritmo genético </a:t>
             </a:r>
             <a:r>
               <a:rPr lang="pt-BR" dirty="0"/>
@@ -11757,8 +12119,8 @@
         </p:blipFill>
         <p:spPr bwMode="auto">
           <a:xfrm>
-            <a:off x="684212" y="2671812"/>
-            <a:ext cx="7058501" cy="3712905"/>
+            <a:off x="5703367" y="853977"/>
+            <a:ext cx="3199125" cy="1682800"/>
           </a:xfrm>
           <a:prstGeom prst="rect">
             <a:avLst/>
@@ -11819,7 +12181,6 @@
               <a:rPr lang="pt-BR" sz="2400" dirty="0" smtClean="0"/>
               <a:t>ositivos?</a:t>
             </a:r>
-            <a:endParaRPr lang="pt-BR" sz="2400" dirty="0" smtClean="0"/>
           </a:p>
           <a:p>
             <a:pPr marL="285750" indent="-285750">
@@ -11830,10 +12191,39 @@
               <a:rPr lang="pt-BR" sz="2400" dirty="0" smtClean="0"/>
               <a:t>Quais os pontos negativos?</a:t>
             </a:r>
-            <a:endParaRPr lang="pt-BR" sz="2400" dirty="0" smtClean="0"/>
-          </a:p>
-        </p:txBody>
-      </p:sp>
+          </a:p>
+        </p:txBody>
+      </p:sp>
+      <p:pic>
+        <p:nvPicPr>
+          <p:cNvPr id="3" name="Imagem 2"/>
+          <p:cNvPicPr>
+            <a:picLocks noChangeAspect="1"/>
+          </p:cNvPicPr>
+          <p:nvPr/>
+        </p:nvPicPr>
+        <p:blipFill>
+          <a:blip r:embed="rId3">
+            <a:extLst>
+              <a:ext uri="{28A0092B-C50C-407E-A947-70E740481C1C}">
+                <a14:useLocalDpi xmlns:a14="http://schemas.microsoft.com/office/drawing/2010/main" val="0"/>
+              </a:ext>
+            </a:extLst>
+          </a:blip>
+          <a:stretch>
+            <a:fillRect/>
+          </a:stretch>
+        </p:blipFill>
+        <p:spPr>
+          <a:xfrm>
+            <a:off x="803129" y="2466094"/>
+            <a:ext cx="4440167" cy="4157128"/>
+          </a:xfrm>
+          <a:prstGeom prst="rect">
+            <a:avLst/>
+          </a:prstGeom>
+        </p:spPr>
+      </p:pic>
     </p:spTree>
     <p:extLst>
       <p:ext uri="{BB962C8B-B14F-4D97-AF65-F5344CB8AC3E}">
@@ -12376,7 +12766,11 @@
           <a:p>
             <a:r>
               <a:rPr lang="pt-BR" sz="2400" dirty="0" smtClean="0"/>
-              <a:t>Com Algoritmos </a:t>
+              <a:t>com </a:t>
+            </a:r>
+            <a:r>
+              <a:rPr lang="pt-BR" sz="2400" dirty="0" smtClean="0"/>
+              <a:t>Algoritmos </a:t>
             </a:r>
             <a:r>
               <a:rPr lang="pt-BR" sz="2400" dirty="0" err="1" smtClean="0"/>
@@ -12393,7 +12787,6 @@
               <a:rPr lang="pt-BR" sz="2400" dirty="0" smtClean="0"/>
               <a:t>Mensurar os resultados</a:t>
             </a:r>
-            <a:endParaRPr lang="pt-BR" sz="2400" dirty="0" smtClean="0"/>
           </a:p>
         </p:txBody>
       </p:sp>

</xml_diff>